<commit_message>
add presentation pptx and pdf
</commit_message>
<xml_diff>
--- a/ระบบบริหารจัดการข้อมูลการบริจาคโลหิต2.pptx
+++ b/ระบบบริหารจัดการข้อมูลการบริจาคโลหิต2.pptx
@@ -12,6 +12,7 @@
     <p:sldId id="259" r:id="rId6"/>
     <p:sldId id="260" r:id="rId7"/>
     <p:sldId id="261" r:id="rId8"/>
+    <p:sldId id="264" r:id="rId9"/>
   </p:sldIdLst>
   <p:sldSz cx="12192000" cy="6858000"/>
   <p:notesSz cx="6858000" cy="9144000"/>
@@ -110,6 +111,11 @@
       </a:defRPr>
     </a:lvl9pPr>
   </p:defaultTextStyle>
+  <p:extLst>
+    <p:ext uri="{EFAFB233-063F-42B5-8137-9DF3F51BA10A}">
+      <p15:sldGuideLst xmlns:p15="http://schemas.microsoft.com/office/powerpoint/2012/main"/>
+    </p:ext>
+  </p:extLst>
 </p:presentation>
 </file>
 
@@ -304,7 +310,7 @@
           <a:p>
             <a:fld id="{17B2EAEA-8B6D-4A5C-B8F4-0E6A75B22EAD}" type="datetimeFigureOut">
               <a:rPr lang="th-TH" smtClean="0"/>
-              <a:t>19/04/60</a:t>
+              <a:t>20/04/60</a:t>
             </a:fld>
             <a:endParaRPr lang="th-TH"/>
           </a:p>
@@ -514,7 +520,7 @@
           <a:p>
             <a:fld id="{17B2EAEA-8B6D-4A5C-B8F4-0E6A75B22EAD}" type="datetimeFigureOut">
               <a:rPr lang="th-TH" smtClean="0"/>
-              <a:t>19/04/60</a:t>
+              <a:t>20/04/60</a:t>
             </a:fld>
             <a:endParaRPr lang="th-TH"/>
           </a:p>
@@ -694,7 +700,7 @@
           <a:p>
             <a:fld id="{17B2EAEA-8B6D-4A5C-B8F4-0E6A75B22EAD}" type="datetimeFigureOut">
               <a:rPr lang="th-TH" smtClean="0"/>
-              <a:t>19/04/60</a:t>
+              <a:t>20/04/60</a:t>
             </a:fld>
             <a:endParaRPr lang="th-TH"/>
           </a:p>
@@ -864,7 +870,7 @@
           <a:p>
             <a:fld id="{17B2EAEA-8B6D-4A5C-B8F4-0E6A75B22EAD}" type="datetimeFigureOut">
               <a:rPr lang="th-TH" smtClean="0"/>
-              <a:t>19/04/60</a:t>
+              <a:t>20/04/60</a:t>
             </a:fld>
             <a:endParaRPr lang="th-TH"/>
           </a:p>
@@ -1118,7 +1124,7 @@
           <a:p>
             <a:fld id="{17B2EAEA-8B6D-4A5C-B8F4-0E6A75B22EAD}" type="datetimeFigureOut">
               <a:rPr lang="th-TH" smtClean="0"/>
-              <a:t>19/04/60</a:t>
+              <a:t>20/04/60</a:t>
             </a:fld>
             <a:endParaRPr lang="th-TH"/>
           </a:p>
@@ -1444,7 +1450,7 @@
           <a:p>
             <a:fld id="{17B2EAEA-8B6D-4A5C-B8F4-0E6A75B22EAD}" type="datetimeFigureOut">
               <a:rPr lang="th-TH" smtClean="0"/>
-              <a:t>19/04/60</a:t>
+              <a:t>20/04/60</a:t>
             </a:fld>
             <a:endParaRPr lang="th-TH"/>
           </a:p>
@@ -1895,7 +1901,7 @@
           <a:p>
             <a:fld id="{17B2EAEA-8B6D-4A5C-B8F4-0E6A75B22EAD}" type="datetimeFigureOut">
               <a:rPr lang="th-TH" smtClean="0"/>
-              <a:t>19/04/60</a:t>
+              <a:t>20/04/60</a:t>
             </a:fld>
             <a:endParaRPr lang="th-TH"/>
           </a:p>
@@ -2013,7 +2019,7 @@
           <a:p>
             <a:fld id="{17B2EAEA-8B6D-4A5C-B8F4-0E6A75B22EAD}" type="datetimeFigureOut">
               <a:rPr lang="th-TH" smtClean="0"/>
-              <a:t>19/04/60</a:t>
+              <a:t>20/04/60</a:t>
             </a:fld>
             <a:endParaRPr lang="th-TH"/>
           </a:p>
@@ -2108,7 +2114,7 @@
           <a:p>
             <a:fld id="{17B2EAEA-8B6D-4A5C-B8F4-0E6A75B22EAD}" type="datetimeFigureOut">
               <a:rPr lang="th-TH" smtClean="0"/>
-              <a:t>19/04/60</a:t>
+              <a:t>20/04/60</a:t>
             </a:fld>
             <a:endParaRPr lang="th-TH"/>
           </a:p>
@@ -2395,7 +2401,7 @@
           <a:p>
             <a:fld id="{17B2EAEA-8B6D-4A5C-B8F4-0E6A75B22EAD}" type="datetimeFigureOut">
               <a:rPr lang="th-TH" smtClean="0"/>
-              <a:t>19/04/60</a:t>
+              <a:t>20/04/60</a:t>
             </a:fld>
             <a:endParaRPr lang="th-TH"/>
           </a:p>
@@ -2713,7 +2719,7 @@
           <a:p>
             <a:fld id="{17B2EAEA-8B6D-4A5C-B8F4-0E6A75B22EAD}" type="datetimeFigureOut">
               <a:rPr lang="th-TH" smtClean="0"/>
-              <a:t>19/04/60</a:t>
+              <a:t>20/04/60</a:t>
             </a:fld>
             <a:endParaRPr lang="th-TH"/>
           </a:p>
@@ -2965,7 +2971,7 @@
           <a:p>
             <a:fld id="{17B2EAEA-8B6D-4A5C-B8F4-0E6A75B22EAD}" type="datetimeFigureOut">
               <a:rPr lang="th-TH" smtClean="0"/>
-              <a:t>19/04/60</a:t>
+              <a:t>20/04/60</a:t>
             </a:fld>
             <a:endParaRPr lang="th-TH"/>
           </a:p>
@@ -4370,6 +4376,82 @@
 </p:sld>
 </file>
 
+<file path=ppt/slides/slide8.xml><?xml version="1.0" encoding="utf-8"?>
+<p:sld xmlns:a="http://schemas.openxmlformats.org/drawingml/2006/main" xmlns:r="http://schemas.openxmlformats.org/officeDocument/2006/relationships" xmlns:p="http://schemas.openxmlformats.org/presentationml/2006/main">
+  <p:cSld>
+    <p:spTree>
+      <p:nvGrpSpPr>
+        <p:cNvPr id="1" name=""/>
+        <p:cNvGrpSpPr/>
+        <p:nvPr/>
+      </p:nvGrpSpPr>
+      <p:grpSpPr>
+        <a:xfrm>
+          <a:off x="0" y="0"/>
+          <a:ext cx="0" cy="0"/>
+          <a:chOff x="0" y="0"/>
+          <a:chExt cx="0" cy="0"/>
+        </a:xfrm>
+      </p:grpSpPr>
+      <p:sp>
+        <p:nvSpPr>
+          <p:cNvPr id="2" name="ชื่อเรื่อง 1"/>
+          <p:cNvSpPr>
+            <a:spLocks noGrp="1"/>
+          </p:cNvSpPr>
+          <p:nvPr>
+            <p:ph type="title"/>
+          </p:nvPr>
+        </p:nvSpPr>
+        <p:spPr>
+          <a:xfrm>
+            <a:off x="1222116" y="2356237"/>
+            <a:ext cx="9692640" cy="1428929"/>
+          </a:xfrm>
+        </p:spPr>
+        <p:txBody>
+          <a:bodyPr>
+            <a:normAutofit/>
+          </a:bodyPr>
+          <a:lstStyle/>
+          <a:p>
+            <a:r>
+              <a:rPr lang="en-US" sz="8000" dirty="0">
+                <a:solidFill>
+                  <a:schemeClr val="accent1">
+                    <a:lumMod val="75000"/>
+                  </a:schemeClr>
+                </a:solidFill>
+                <a:latin typeface="Superspace Regular" panose="02000000000000000000" pitchFamily="2" charset="0"/>
+                <a:cs typeface="Superspace Regular" panose="02000000000000000000" pitchFamily="2" charset="0"/>
+              </a:rPr>
+              <a:t>DEMO PROGRAM</a:t>
+            </a:r>
+            <a:endParaRPr lang="th-TH" sz="8000" dirty="0">
+              <a:solidFill>
+                <a:schemeClr val="accent1">
+                  <a:lumMod val="75000"/>
+                </a:schemeClr>
+              </a:solidFill>
+              <a:latin typeface="Superspace Regular" panose="02000000000000000000" pitchFamily="2" charset="0"/>
+              <a:cs typeface="Superspace Regular" panose="02000000000000000000" pitchFamily="2" charset="0"/>
+            </a:endParaRPr>
+          </a:p>
+        </p:txBody>
+      </p:sp>
+    </p:spTree>
+    <p:extLst>
+      <p:ext uri="{BB962C8B-B14F-4D97-AF65-F5344CB8AC3E}">
+        <p14:creationId xmlns:p14="http://schemas.microsoft.com/office/powerpoint/2010/main" val="3329014511"/>
+      </p:ext>
+    </p:extLst>
+  </p:cSld>
+  <p:clrMapOvr>
+    <a:masterClrMapping/>
+  </p:clrMapOvr>
+</p:sld>
+</file>
+
 <file path=ppt/theme/theme1.xml><?xml version="1.0" encoding="utf-8"?>
 <a:theme xmlns:a="http://schemas.openxmlformats.org/drawingml/2006/main" name="View">
   <a:themeElements>

</xml_diff>